<commit_message>
add prezentacija s velikog laptopa
</commit_message>
<xml_diff>
--- a/Prezentacije/prezentacija s velikog laptopa.pptx
+++ b/Prezentacije/prezentacija s velikog laptopa.pptx
@@ -4,6 +4,9 @@
   <p:sldMasterIdLst>
     <p:sldMasterId id="2147483648" r:id="rId1"/>
   </p:sldMasterIdLst>
+  <p:sldIdLst>
+    <p:sldId id="256" r:id="rId2"/>
+  </p:sldIdLst>
   <p:sldSz cx="9144000" cy="6858000" type="screen4x3"/>
   <p:notesSz cx="6858000" cy="9144000"/>
   <p:defaultTextStyle>
@@ -285,7 +288,8 @@
           <a:p>
             <a:fld id="{FDC1A071-2A74-455A-A49A-8BB21E4AC2F6}" type="datetimeFigureOut">
               <a:rPr lang="sr-Latn-CS" smtClean="0"/>
-              <a:t>16.3.2007</a:t>
+              <a:pPr/>
+              <a:t>10.3.2020</a:t>
             </a:fld>
             <a:endParaRPr lang="hr-HR"/>
           </a:p>
@@ -327,6 +331,7 @@
           <a:p>
             <a:fld id="{6FDD72BF-B849-4E00-8E72-529104776363}" type="slidenum">
               <a:rPr lang="hr-HR" smtClean="0"/>
+              <a:pPr/>
               <a:t>‹#›</a:t>
             </a:fld>
             <a:endParaRPr lang="hr-HR"/>
@@ -450,7 +455,8 @@
           <a:p>
             <a:fld id="{FDC1A071-2A74-455A-A49A-8BB21E4AC2F6}" type="datetimeFigureOut">
               <a:rPr lang="sr-Latn-CS" smtClean="0"/>
-              <a:t>16.3.2007</a:t>
+              <a:pPr/>
+              <a:t>10.3.2020</a:t>
             </a:fld>
             <a:endParaRPr lang="hr-HR"/>
           </a:p>
@@ -492,6 +498,7 @@
           <a:p>
             <a:fld id="{6FDD72BF-B849-4E00-8E72-529104776363}" type="slidenum">
               <a:rPr lang="hr-HR" smtClean="0"/>
+              <a:pPr/>
               <a:t>‹#›</a:t>
             </a:fld>
             <a:endParaRPr lang="hr-HR"/>
@@ -625,7 +632,8 @@
           <a:p>
             <a:fld id="{FDC1A071-2A74-455A-A49A-8BB21E4AC2F6}" type="datetimeFigureOut">
               <a:rPr lang="sr-Latn-CS" smtClean="0"/>
-              <a:t>16.3.2007</a:t>
+              <a:pPr/>
+              <a:t>10.3.2020</a:t>
             </a:fld>
             <a:endParaRPr lang="hr-HR"/>
           </a:p>
@@ -667,6 +675,7 @@
           <a:p>
             <a:fld id="{6FDD72BF-B849-4E00-8E72-529104776363}" type="slidenum">
               <a:rPr lang="hr-HR" smtClean="0"/>
+              <a:pPr/>
               <a:t>‹#›</a:t>
             </a:fld>
             <a:endParaRPr lang="hr-HR"/>
@@ -790,7 +799,8 @@
           <a:p>
             <a:fld id="{FDC1A071-2A74-455A-A49A-8BB21E4AC2F6}" type="datetimeFigureOut">
               <a:rPr lang="sr-Latn-CS" smtClean="0"/>
-              <a:t>16.3.2007</a:t>
+              <a:pPr/>
+              <a:t>10.3.2020</a:t>
             </a:fld>
             <a:endParaRPr lang="hr-HR"/>
           </a:p>
@@ -832,6 +842,7 @@
           <a:p>
             <a:fld id="{6FDD72BF-B849-4E00-8E72-529104776363}" type="slidenum">
               <a:rPr lang="hr-HR" smtClean="0"/>
+              <a:pPr/>
               <a:t>‹#›</a:t>
             </a:fld>
             <a:endParaRPr lang="hr-HR"/>
@@ -1031,7 +1042,8 @@
           <a:p>
             <a:fld id="{FDC1A071-2A74-455A-A49A-8BB21E4AC2F6}" type="datetimeFigureOut">
               <a:rPr lang="sr-Latn-CS" smtClean="0"/>
-              <a:t>16.3.2007</a:t>
+              <a:pPr/>
+              <a:t>10.3.2020</a:t>
             </a:fld>
             <a:endParaRPr lang="hr-HR"/>
           </a:p>
@@ -1073,6 +1085,7 @@
           <a:p>
             <a:fld id="{6FDD72BF-B849-4E00-8E72-529104776363}" type="slidenum">
               <a:rPr lang="hr-HR" smtClean="0"/>
+              <a:pPr/>
               <a:t>‹#›</a:t>
             </a:fld>
             <a:endParaRPr lang="hr-HR"/>
@@ -1314,7 +1327,8 @@
           <a:p>
             <a:fld id="{FDC1A071-2A74-455A-A49A-8BB21E4AC2F6}" type="datetimeFigureOut">
               <a:rPr lang="sr-Latn-CS" smtClean="0"/>
-              <a:t>16.3.2007</a:t>
+              <a:pPr/>
+              <a:t>10.3.2020</a:t>
             </a:fld>
             <a:endParaRPr lang="hr-HR"/>
           </a:p>
@@ -1356,6 +1370,7 @@
           <a:p>
             <a:fld id="{6FDD72BF-B849-4E00-8E72-529104776363}" type="slidenum">
               <a:rPr lang="hr-HR" smtClean="0"/>
+              <a:pPr/>
               <a:t>‹#›</a:t>
             </a:fld>
             <a:endParaRPr lang="hr-HR"/>
@@ -1731,7 +1746,8 @@
           <a:p>
             <a:fld id="{FDC1A071-2A74-455A-A49A-8BB21E4AC2F6}" type="datetimeFigureOut">
               <a:rPr lang="sr-Latn-CS" smtClean="0"/>
-              <a:t>16.3.2007</a:t>
+              <a:pPr/>
+              <a:t>10.3.2020</a:t>
             </a:fld>
             <a:endParaRPr lang="hr-HR"/>
           </a:p>
@@ -1773,6 +1789,7 @@
           <a:p>
             <a:fld id="{6FDD72BF-B849-4E00-8E72-529104776363}" type="slidenum">
               <a:rPr lang="hr-HR" smtClean="0"/>
+              <a:pPr/>
               <a:t>‹#›</a:t>
             </a:fld>
             <a:endParaRPr lang="hr-HR"/>
@@ -1844,7 +1861,8 @@
           <a:p>
             <a:fld id="{FDC1A071-2A74-455A-A49A-8BB21E4AC2F6}" type="datetimeFigureOut">
               <a:rPr lang="sr-Latn-CS" smtClean="0"/>
-              <a:t>16.3.2007</a:t>
+              <a:pPr/>
+              <a:t>10.3.2020</a:t>
             </a:fld>
             <a:endParaRPr lang="hr-HR"/>
           </a:p>
@@ -1886,6 +1904,7 @@
           <a:p>
             <a:fld id="{6FDD72BF-B849-4E00-8E72-529104776363}" type="slidenum">
               <a:rPr lang="hr-HR" smtClean="0"/>
+              <a:pPr/>
               <a:t>‹#›</a:t>
             </a:fld>
             <a:endParaRPr lang="hr-HR"/>
@@ -1934,7 +1953,8 @@
           <a:p>
             <a:fld id="{FDC1A071-2A74-455A-A49A-8BB21E4AC2F6}" type="datetimeFigureOut">
               <a:rPr lang="sr-Latn-CS" smtClean="0"/>
-              <a:t>16.3.2007</a:t>
+              <a:pPr/>
+              <a:t>10.3.2020</a:t>
             </a:fld>
             <a:endParaRPr lang="hr-HR"/>
           </a:p>
@@ -1976,6 +1996,7 @@
           <a:p>
             <a:fld id="{6FDD72BF-B849-4E00-8E72-529104776363}" type="slidenum">
               <a:rPr lang="hr-HR" smtClean="0"/>
+              <a:pPr/>
               <a:t>‹#›</a:t>
             </a:fld>
             <a:endParaRPr lang="hr-HR"/>
@@ -2206,7 +2227,8 @@
           <a:p>
             <a:fld id="{FDC1A071-2A74-455A-A49A-8BB21E4AC2F6}" type="datetimeFigureOut">
               <a:rPr lang="sr-Latn-CS" smtClean="0"/>
-              <a:t>16.3.2007</a:t>
+              <a:pPr/>
+              <a:t>10.3.2020</a:t>
             </a:fld>
             <a:endParaRPr lang="hr-HR"/>
           </a:p>
@@ -2248,6 +2270,7 @@
           <a:p>
             <a:fld id="{6FDD72BF-B849-4E00-8E72-529104776363}" type="slidenum">
               <a:rPr lang="hr-HR" smtClean="0"/>
+              <a:pPr/>
               <a:t>‹#›</a:t>
             </a:fld>
             <a:endParaRPr lang="hr-HR"/>
@@ -2454,7 +2477,8 @@
           <a:p>
             <a:fld id="{FDC1A071-2A74-455A-A49A-8BB21E4AC2F6}" type="datetimeFigureOut">
               <a:rPr lang="sr-Latn-CS" smtClean="0"/>
-              <a:t>16.3.2007</a:t>
+              <a:pPr/>
+              <a:t>10.3.2020</a:t>
             </a:fld>
             <a:endParaRPr lang="hr-HR"/>
           </a:p>
@@ -2496,6 +2520,7 @@
           <a:p>
             <a:fld id="{6FDD72BF-B849-4E00-8E72-529104776363}" type="slidenum">
               <a:rPr lang="hr-HR" smtClean="0"/>
+              <a:pPr/>
               <a:t>‹#›</a:t>
             </a:fld>
             <a:endParaRPr lang="hr-HR"/>
@@ -2662,7 +2687,8 @@
           <a:p>
             <a:fld id="{FDC1A071-2A74-455A-A49A-8BB21E4AC2F6}" type="datetimeFigureOut">
               <a:rPr lang="sr-Latn-CS" smtClean="0"/>
-              <a:t>16.3.2007</a:t>
+              <a:pPr/>
+              <a:t>10.3.2020</a:t>
             </a:fld>
             <a:endParaRPr lang="hr-HR"/>
           </a:p>
@@ -2740,6 +2766,7 @@
           <a:p>
             <a:fld id="{6FDD72BF-B849-4E00-8E72-529104776363}" type="slidenum">
               <a:rPr lang="hr-HR" smtClean="0"/>
+              <a:pPr/>
               <a:t>‹#›</a:t>
             </a:fld>
             <a:endParaRPr lang="hr-HR"/>
@@ -3013,6 +3040,92 @@
     </p:otherStyle>
   </p:txStyles>
 </p:sldMaster>
+</file>
+
+<file path=ppt/slides/slide1.xml><?xml version="1.0" encoding="utf-8"?>
+<p:sld xmlns:a="http://schemas.openxmlformats.org/drawingml/2006/main" xmlns:r="http://schemas.openxmlformats.org/officeDocument/2006/relationships" xmlns:p="http://schemas.openxmlformats.org/presentationml/2006/main">
+  <p:cSld>
+    <p:spTree>
+      <p:nvGrpSpPr>
+        <p:cNvPr id="1" name=""/>
+        <p:cNvGrpSpPr/>
+        <p:nvPr/>
+      </p:nvGrpSpPr>
+      <p:grpSpPr>
+        <a:xfrm>
+          <a:off x="0" y="0"/>
+          <a:ext cx="0" cy="0"/>
+          <a:chOff x="0" y="0"/>
+          <a:chExt cx="0" cy="0"/>
+        </a:xfrm>
+      </p:grpSpPr>
+      <p:sp>
+        <p:nvSpPr>
+          <p:cNvPr id="2" name="Naslov 1"/>
+          <p:cNvSpPr>
+            <a:spLocks noGrp="1"/>
+          </p:cNvSpPr>
+          <p:nvPr>
+            <p:ph type="ctrTitle"/>
+          </p:nvPr>
+        </p:nvSpPr>
+        <p:spPr/>
+        <p:txBody>
+          <a:bodyPr/>
+          <a:lstStyle/>
+          <a:p>
+            <a:r>
+              <a:rPr lang="hr-HR" dirty="0" smtClean="0"/>
+              <a:t>Novi tekst na novoj </a:t>
+            </a:r>
+            <a:r>
+              <a:rPr lang="hr-HR" dirty="0" err="1" smtClean="0"/>
+              <a:t>prezi</a:t>
+            </a:r>
+            <a:r>
+              <a:rPr lang="hr-HR" dirty="0" smtClean="0"/>
+              <a:t/>
+            </a:r>
+            <a:br>
+              <a:rPr lang="hr-HR" dirty="0" smtClean="0"/>
+            </a:br>
+            <a:r>
+              <a:rPr lang="hr-HR" dirty="0" smtClean="0"/>
+              <a:t>s velikog </a:t>
+            </a:r>
+            <a:r>
+              <a:rPr lang="hr-HR" smtClean="0"/>
+              <a:t>laptopas</a:t>
+            </a:r>
+            <a:endParaRPr lang="hr-HR"/>
+          </a:p>
+        </p:txBody>
+      </p:sp>
+      <p:sp>
+        <p:nvSpPr>
+          <p:cNvPr id="3" name="Podnaslov 2"/>
+          <p:cNvSpPr>
+            <a:spLocks noGrp="1"/>
+          </p:cNvSpPr>
+          <p:nvPr>
+            <p:ph type="subTitle" idx="1"/>
+          </p:nvPr>
+        </p:nvSpPr>
+        <p:spPr/>
+        <p:txBody>
+          <a:bodyPr/>
+          <a:lstStyle/>
+          <a:p>
+            <a:endParaRPr lang="hr-HR"/>
+          </a:p>
+        </p:txBody>
+      </p:sp>
+    </p:spTree>
+  </p:cSld>
+  <p:clrMapOvr>
+    <a:masterClrMapping/>
+  </p:clrMapOvr>
+</p:sld>
 </file>
 
 <file path=ppt/theme/theme1.xml><?xml version="1.0" encoding="utf-8"?>

</xml_diff>